<commit_message>
Again :) full of image changes.
</commit_message>
<xml_diff>
--- a/journalWallFriction/pictures/pdf/twoRobotRegionH.pptx
+++ b/journalWallFriction/pictures/pdf/twoRobotRegionH.pptx
@@ -302,7 +302,7 @@
           <a:p>
             <a:fld id="{F6D6B451-1FDA-7B46-B0DD-5E4B6F79F8BF}" type="datetimeFigureOut">
               <a:rPr lang="en-US" smtClean="0"/>
-              <a:t>4/17/18</a:t>
+              <a:t>5/22/18</a:t>
             </a:fld>
             <a:endParaRPr lang="en-US"/>
           </a:p>
@@ -470,7 +470,7 @@
           <a:p>
             <a:fld id="{F6D6B451-1FDA-7B46-B0DD-5E4B6F79F8BF}" type="datetimeFigureOut">
               <a:rPr lang="en-US" smtClean="0"/>
-              <a:t>4/17/18</a:t>
+              <a:t>5/22/18</a:t>
             </a:fld>
             <a:endParaRPr lang="en-US"/>
           </a:p>
@@ -648,7 +648,7 @@
           <a:p>
             <a:fld id="{F6D6B451-1FDA-7B46-B0DD-5E4B6F79F8BF}" type="datetimeFigureOut">
               <a:rPr lang="en-US" smtClean="0"/>
-              <a:t>4/17/18</a:t>
+              <a:t>5/22/18</a:t>
             </a:fld>
             <a:endParaRPr lang="en-US"/>
           </a:p>
@@ -816,7 +816,7 @@
           <a:p>
             <a:fld id="{F6D6B451-1FDA-7B46-B0DD-5E4B6F79F8BF}" type="datetimeFigureOut">
               <a:rPr lang="en-US" smtClean="0"/>
-              <a:t>4/17/18</a:t>
+              <a:t>5/22/18</a:t>
             </a:fld>
             <a:endParaRPr lang="en-US"/>
           </a:p>
@@ -1061,7 +1061,7 @@
           <a:p>
             <a:fld id="{F6D6B451-1FDA-7B46-B0DD-5E4B6F79F8BF}" type="datetimeFigureOut">
               <a:rPr lang="en-US" smtClean="0"/>
-              <a:t>4/17/18</a:t>
+              <a:t>5/22/18</a:t>
             </a:fld>
             <a:endParaRPr lang="en-US"/>
           </a:p>
@@ -1346,7 +1346,7 @@
           <a:p>
             <a:fld id="{F6D6B451-1FDA-7B46-B0DD-5E4B6F79F8BF}" type="datetimeFigureOut">
               <a:rPr lang="en-US" smtClean="0"/>
-              <a:t>4/17/18</a:t>
+              <a:t>5/22/18</a:t>
             </a:fld>
             <a:endParaRPr lang="en-US"/>
           </a:p>
@@ -1770,7 +1770,7 @@
           <a:p>
             <a:fld id="{F6D6B451-1FDA-7B46-B0DD-5E4B6F79F8BF}" type="datetimeFigureOut">
               <a:rPr lang="en-US" smtClean="0"/>
-              <a:t>4/17/18</a:t>
+              <a:t>5/22/18</a:t>
             </a:fld>
             <a:endParaRPr lang="en-US"/>
           </a:p>
@@ -1887,7 +1887,7 @@
           <a:p>
             <a:fld id="{F6D6B451-1FDA-7B46-B0DD-5E4B6F79F8BF}" type="datetimeFigureOut">
               <a:rPr lang="en-US" smtClean="0"/>
-              <a:t>4/17/18</a:t>
+              <a:t>5/22/18</a:t>
             </a:fld>
             <a:endParaRPr lang="en-US"/>
           </a:p>
@@ -1982,7 +1982,7 @@
           <a:p>
             <a:fld id="{F6D6B451-1FDA-7B46-B0DD-5E4B6F79F8BF}" type="datetimeFigureOut">
               <a:rPr lang="en-US" smtClean="0"/>
-              <a:t>4/17/18</a:t>
+              <a:t>5/22/18</a:t>
             </a:fld>
             <a:endParaRPr lang="en-US"/>
           </a:p>
@@ -2257,7 +2257,7 @@
           <a:p>
             <a:fld id="{F6D6B451-1FDA-7B46-B0DD-5E4B6F79F8BF}" type="datetimeFigureOut">
               <a:rPr lang="en-US" smtClean="0"/>
-              <a:t>4/17/18</a:t>
+              <a:t>5/22/18</a:t>
             </a:fld>
             <a:endParaRPr lang="en-US"/>
           </a:p>
@@ -2509,7 +2509,7 @@
           <a:p>
             <a:fld id="{F6D6B451-1FDA-7B46-B0DD-5E4B6F79F8BF}" type="datetimeFigureOut">
               <a:rPr lang="en-US" smtClean="0"/>
-              <a:t>4/17/18</a:t>
+              <a:t>5/22/18</a:t>
             </a:fld>
             <a:endParaRPr lang="en-US"/>
           </a:p>
@@ -2720,7 +2720,7 @@
           <a:p>
             <a:fld id="{F6D6B451-1FDA-7B46-B0DD-5E4B6F79F8BF}" type="datetimeFigureOut">
               <a:rPr lang="en-US" smtClean="0"/>
-              <a:t>4/17/18</a:t>
+              <a:t>5/22/18</a:t>
             </a:fld>
             <a:endParaRPr lang="en-US"/>
           </a:p>
@@ -3172,12 +3172,12 @@
           <a:prstGeom prst="rect">
             <a:avLst/>
           </a:prstGeom>
-          <a:blipFill rotWithShape="1">
-            <a:blip r:embed="rId3">
-              <a:alphaModFix amt="28000"/>
-            </a:blip>
-            <a:tile tx="0" ty="0" sx="100000" sy="100000" flip="none" algn="tl"/>
-          </a:blipFill>
+          <a:solidFill>
+            <a:schemeClr val="accent1">
+              <a:lumMod val="40000"/>
+              <a:lumOff val="60000"/>
+            </a:schemeClr>
+          </a:solidFill>
           <a:ln>
             <a:noFill/>
           </a:ln>
@@ -3328,8 +3328,8 @@
         </p:nvSpPr>
         <p:spPr>
           <a:xfrm>
-            <a:off x="36512" y="5147992"/>
-            <a:ext cx="5241925" cy="830997"/>
+            <a:off x="128977" y="5147992"/>
+            <a:ext cx="7761573" cy="707886"/>
           </a:xfrm>
           <a:prstGeom prst="rect">
             <a:avLst/>
@@ -3343,21 +3343,28 @@
           <a:lstStyle/>
           <a:p>
             <a:r>
-              <a:rPr lang="en-US" sz="4800" dirty="0">
+              <a:rPr lang="en-US" sz="4000">
                 <a:latin typeface="Times New Roman"/>
                 <a:cs typeface="Times New Roman"/>
               </a:rPr>
-              <a:t>Reachable set for </a:t>
-            </a:r>
-            <a:r>
-              <a:rPr lang="en-US" sz="4800" i="1" dirty="0">
+              <a:t>2-move reachable </a:t>
+            </a:r>
+            <a:r>
+              <a:rPr lang="en-US" sz="4000" dirty="0">
+                <a:latin typeface="Times New Roman"/>
+                <a:cs typeface="Times New Roman"/>
+              </a:rPr>
+              <a:t>set for </a:t>
+            </a:r>
+            <a:r>
+              <a:rPr lang="en-US" sz="4000" i="1" dirty="0">
                 <a:latin typeface="Times New Roman"/>
                 <a:cs typeface="Times New Roman"/>
               </a:rPr>
               <a:t>s</a:t>
             </a:r>
             <a:r>
-              <a:rPr lang="en-US" sz="4800" i="1" baseline="-25000" dirty="0">
+              <a:rPr lang="en-US" sz="4000" i="1" baseline="-25000" dirty="0">
                 <a:latin typeface="Times New Roman"/>
                 <a:cs typeface="Times New Roman"/>
               </a:rPr>

</xml_diff>